<commit_message>
Files added for Lego-based sessions
Intentionally flawed instructions for making a Lego microscope,
available in ODT, PDF and DOCX formats.
</commit_message>
<xml_diff>
--- a/Lecture1A-OpenAndRepro-Beta.pptx
+++ b/Lecture1A-OpenAndRepro-Beta.pptx
@@ -304,7 +304,7 @@
           <a:p>
             <a:fld id="{DB44D3C2-DE9E-4880-8F88-8211D21A37AD}" type="datetimeFigureOut">
               <a:rPr lang="en-GB" smtClean="0"/>
-              <a:t>18/10/2013</a:t>
+              <a:t>21/10/2013</a:t>
             </a:fld>
             <a:endParaRPr lang="en-GB"/>
           </a:p>
@@ -474,7 +474,7 @@
           <a:p>
             <a:fld id="{DB44D3C2-DE9E-4880-8F88-8211D21A37AD}" type="datetimeFigureOut">
               <a:rPr lang="en-GB" smtClean="0"/>
-              <a:t>18/10/2013</a:t>
+              <a:t>21/10/2013</a:t>
             </a:fld>
             <a:endParaRPr lang="en-GB"/>
           </a:p>
@@ -654,7 +654,7 @@
           <a:p>
             <a:fld id="{DB44D3C2-DE9E-4880-8F88-8211D21A37AD}" type="datetimeFigureOut">
               <a:rPr lang="en-GB" smtClean="0"/>
-              <a:t>18/10/2013</a:t>
+              <a:t>21/10/2013</a:t>
             </a:fld>
             <a:endParaRPr lang="en-GB"/>
           </a:p>
@@ -824,7 +824,7 @@
           <a:p>
             <a:fld id="{DB44D3C2-DE9E-4880-8F88-8211D21A37AD}" type="datetimeFigureOut">
               <a:rPr lang="en-GB" smtClean="0"/>
-              <a:t>18/10/2013</a:t>
+              <a:t>21/10/2013</a:t>
             </a:fld>
             <a:endParaRPr lang="en-GB"/>
           </a:p>
@@ -1070,7 +1070,7 @@
           <a:p>
             <a:fld id="{DB44D3C2-DE9E-4880-8F88-8211D21A37AD}" type="datetimeFigureOut">
               <a:rPr lang="en-GB" smtClean="0"/>
-              <a:t>18/10/2013</a:t>
+              <a:t>21/10/2013</a:t>
             </a:fld>
             <a:endParaRPr lang="en-GB"/>
           </a:p>
@@ -1358,7 +1358,7 @@
           <a:p>
             <a:fld id="{DB44D3C2-DE9E-4880-8F88-8211D21A37AD}" type="datetimeFigureOut">
               <a:rPr lang="en-GB" smtClean="0"/>
-              <a:t>18/10/2013</a:t>
+              <a:t>21/10/2013</a:t>
             </a:fld>
             <a:endParaRPr lang="en-GB"/>
           </a:p>
@@ -1780,7 +1780,7 @@
           <a:p>
             <a:fld id="{DB44D3C2-DE9E-4880-8F88-8211D21A37AD}" type="datetimeFigureOut">
               <a:rPr lang="en-GB" smtClean="0"/>
-              <a:t>18/10/2013</a:t>
+              <a:t>21/10/2013</a:t>
             </a:fld>
             <a:endParaRPr lang="en-GB"/>
           </a:p>
@@ -1898,7 +1898,7 @@
           <a:p>
             <a:fld id="{DB44D3C2-DE9E-4880-8F88-8211D21A37AD}" type="datetimeFigureOut">
               <a:rPr lang="en-GB" smtClean="0"/>
-              <a:t>18/10/2013</a:t>
+              <a:t>21/10/2013</a:t>
             </a:fld>
             <a:endParaRPr lang="en-GB"/>
           </a:p>
@@ -1993,7 +1993,7 @@
           <a:p>
             <a:fld id="{DB44D3C2-DE9E-4880-8F88-8211D21A37AD}" type="datetimeFigureOut">
               <a:rPr lang="en-GB" smtClean="0"/>
-              <a:t>18/10/2013</a:t>
+              <a:t>21/10/2013</a:t>
             </a:fld>
             <a:endParaRPr lang="en-GB"/>
           </a:p>
@@ -2270,7 +2270,7 @@
           <a:p>
             <a:fld id="{DB44D3C2-DE9E-4880-8F88-8211D21A37AD}" type="datetimeFigureOut">
               <a:rPr lang="en-GB" smtClean="0"/>
-              <a:t>18/10/2013</a:t>
+              <a:t>21/10/2013</a:t>
             </a:fld>
             <a:endParaRPr lang="en-GB"/>
           </a:p>
@@ -2523,7 +2523,7 @@
           <a:p>
             <a:fld id="{DB44D3C2-DE9E-4880-8F88-8211D21A37AD}" type="datetimeFigureOut">
               <a:rPr lang="en-GB" smtClean="0"/>
-              <a:t>18/10/2013</a:t>
+              <a:t>21/10/2013</a:t>
             </a:fld>
             <a:endParaRPr lang="en-GB"/>
           </a:p>
@@ -2736,7 +2736,7 @@
           <a:p>
             <a:fld id="{DB44D3C2-DE9E-4880-8F88-8211D21A37AD}" type="datetimeFigureOut">
               <a:rPr lang="en-GB" smtClean="0"/>
-              <a:t>18/10/2013</a:t>
+              <a:t>21/10/2013</a:t>
             </a:fld>
             <a:endParaRPr lang="en-GB"/>
           </a:p>
@@ -4712,22 +4712,7 @@
                 <a:latin typeface="Aharoni" pitchFamily="2" charset="-79"/>
                 <a:cs typeface="Aharoni" pitchFamily="2" charset="-79"/>
               </a:rPr>
-              <a:t>Data-Enabled </a:t>
-            </a:r>
-            <a:r>
-              <a:rPr lang="en-GB" sz="4500" b="1" dirty="0" smtClean="0">
-                <a:effectLst>
-                  <a:glow rad="228600">
-                    <a:schemeClr val="accent4">
-                      <a:satMod val="175000"/>
-                      <a:alpha val="40000"/>
-                    </a:schemeClr>
-                  </a:glow>
-                </a:effectLst>
-                <a:latin typeface="Aharoni" pitchFamily="2" charset="-79"/>
-                <a:cs typeface="Aharoni" pitchFamily="2" charset="-79"/>
-              </a:rPr>
-              <a:t>Research</a:t>
+              <a:t>Data-Enabled Research</a:t>
             </a:r>
           </a:p>
         </p:txBody>
@@ -8045,7 +8030,7 @@
           <a:p>
             <a:pPr algn="r"/>
             <a:r>
-              <a:rPr lang="en-GB" sz="5000" b="1" dirty="0" smtClean="0">
+              <a:rPr lang="en-GB" sz="5000" b="1" smtClean="0">
                 <a:effectLst>
                   <a:glow rad="228600">
                     <a:schemeClr val="accent4">
@@ -8059,6 +8044,18 @@
               </a:rPr>
               <a:t>Reproducibility</a:t>
             </a:r>
+            <a:endParaRPr lang="en-GB" sz="5000" b="1" dirty="0" smtClean="0">
+              <a:effectLst>
+                <a:glow rad="228600">
+                  <a:schemeClr val="accent4">
+                    <a:satMod val="175000"/>
+                    <a:alpha val="40000"/>
+                  </a:schemeClr>
+                </a:glow>
+              </a:effectLst>
+              <a:latin typeface="Aharoni" pitchFamily="2" charset="-79"/>
+              <a:cs typeface="Aharoni" pitchFamily="2" charset="-79"/>
+            </a:endParaRPr>
           </a:p>
         </p:txBody>
       </p:sp>

</xml_diff>